<commit_message>
Adjustment to talks of Mads Bertelsen
</commit_message>
<xml_diff>
--- a/CSNS_March_2019/2_Tuesday_March_26th/2_guides/guide_intro_talk.pptx
+++ b/CSNS_March_2019/2_Tuesday_March_26th/2_guides/guide_intro_talk.pptx
@@ -1536,7 +1536,7 @@
           </a:ln>
           <a:extLst>
             <a:ext uri="{C572A759-6A51-4108-AA02-DFA0A04FC94B}">
-              <ma14:wrappingTextBoxFlag xmlns="" xmlns:m="http://schemas.openxmlformats.org/officeDocument/2006/math" xmlns:a14="http://schemas.microsoft.com/office/drawing/2010/main" xmlns:ma14="http://schemas.microsoft.com/office/mac/drawingml/2011/main" val="1"/>
+              <ma14:wrappingTextBoxFlag xmlns:ma14="http://schemas.microsoft.com/office/mac/drawingml/2011/main" xmlns:a14="http://schemas.microsoft.com/office/drawing/2010/main" xmlns:m="http://schemas.openxmlformats.org/officeDocument/2006/math" xmlns="" val="1"/>
             </a:ext>
           </a:extLst>
         </p:spPr>
@@ -1582,7 +1582,7 @@
           </a:ln>
           <a:extLst>
             <a:ext uri="{C572A759-6A51-4108-AA02-DFA0A04FC94B}">
-              <ma14:wrappingTextBoxFlag xmlns="" xmlns:m="http://schemas.openxmlformats.org/officeDocument/2006/math" xmlns:a14="http://schemas.microsoft.com/office/drawing/2010/main" xmlns:ma14="http://schemas.microsoft.com/office/mac/drawingml/2011/main" val="1"/>
+              <ma14:wrappingTextBoxFlag xmlns:ma14="http://schemas.microsoft.com/office/mac/drawingml/2011/main" xmlns:a14="http://schemas.microsoft.com/office/drawing/2010/main" xmlns:m="http://schemas.openxmlformats.org/officeDocument/2006/math" xmlns="" val="1"/>
             </a:ext>
           </a:extLst>
         </p:spPr>
@@ -2570,7 +2570,7 @@
             <a:effectLst/>
             <a:extLst>
               <a:ext uri="{C572A759-6A51-4108-AA02-DFA0A04FC94B}">
-                <ma14:wrappingTextBoxFlag xmlns="" xmlns:m="http://schemas.openxmlformats.org/officeDocument/2006/math" xmlns:a14="http://schemas.microsoft.com/office/drawing/2010/main" xmlns:ma14="http://schemas.microsoft.com/office/mac/drawingml/2011/main" val="1"/>
+                <ma14:wrappingTextBoxFlag xmlns:ma14="http://schemas.microsoft.com/office/mac/drawingml/2011/main" xmlns:a14="http://schemas.microsoft.com/office/drawing/2010/main" xmlns:m="http://schemas.openxmlformats.org/officeDocument/2006/math" xmlns="" val="1"/>
               </a:ext>
             </a:extLst>
           </p:spPr>
@@ -3168,7 +3168,7 @@
           </a:ln>
           <a:extLst>
             <a:ext uri="{C572A759-6A51-4108-AA02-DFA0A04FC94B}">
-              <ma14:wrappingTextBoxFlag xmlns="" xmlns:m="http://schemas.openxmlformats.org/officeDocument/2006/math" xmlns:a14="http://schemas.microsoft.com/office/drawing/2010/main" xmlns:ma14="http://schemas.microsoft.com/office/mac/drawingml/2011/main" val="1"/>
+              <ma14:wrappingTextBoxFlag xmlns:ma14="http://schemas.microsoft.com/office/mac/drawingml/2011/main" xmlns:a14="http://schemas.microsoft.com/office/drawing/2010/main" xmlns:m="http://schemas.openxmlformats.org/officeDocument/2006/math" xmlns="" val="1"/>
             </a:ext>
           </a:extLst>
         </p:spPr>
@@ -3214,7 +3214,7 @@
           </a:ln>
           <a:extLst>
             <a:ext uri="{C572A759-6A51-4108-AA02-DFA0A04FC94B}">
-              <ma14:wrappingTextBoxFlag xmlns="" xmlns:m="http://schemas.openxmlformats.org/officeDocument/2006/math" xmlns:a14="http://schemas.microsoft.com/office/drawing/2010/main" xmlns:ma14="http://schemas.microsoft.com/office/mac/drawingml/2011/main" val="1"/>
+              <ma14:wrappingTextBoxFlag xmlns:ma14="http://schemas.microsoft.com/office/mac/drawingml/2011/main" xmlns:a14="http://schemas.microsoft.com/office/drawing/2010/main" xmlns:m="http://schemas.openxmlformats.org/officeDocument/2006/math" xmlns="" val="1"/>
             </a:ext>
           </a:extLst>
         </p:spPr>
@@ -4118,7 +4118,7 @@
             <a:effectLst/>
             <a:extLst>
               <a:ext uri="{C572A759-6A51-4108-AA02-DFA0A04FC94B}">
-                <ma14:wrappingTextBoxFlag xmlns="" xmlns:m="http://schemas.openxmlformats.org/officeDocument/2006/math" xmlns:a14="http://schemas.microsoft.com/office/drawing/2010/main" xmlns:ma14="http://schemas.microsoft.com/office/mac/drawingml/2011/main" val="1"/>
+                <ma14:wrappingTextBoxFlag xmlns:ma14="http://schemas.microsoft.com/office/mac/drawingml/2011/main" xmlns:a14="http://schemas.microsoft.com/office/drawing/2010/main" xmlns:m="http://schemas.openxmlformats.org/officeDocument/2006/math" xmlns="" val="1"/>
               </a:ext>
             </a:extLst>
           </p:spPr>
@@ -4753,7 +4753,7 @@
           </a:ln>
           <a:extLst>
             <a:ext uri="{C572A759-6A51-4108-AA02-DFA0A04FC94B}">
-              <ma14:wrappingTextBoxFlag xmlns="" xmlns:m="http://schemas.openxmlformats.org/officeDocument/2006/math" xmlns:a14="http://schemas.microsoft.com/office/drawing/2010/main" xmlns:ma14="http://schemas.microsoft.com/office/mac/drawingml/2011/main" val="1"/>
+              <ma14:wrappingTextBoxFlag xmlns:ma14="http://schemas.microsoft.com/office/mac/drawingml/2011/main" xmlns:a14="http://schemas.microsoft.com/office/drawing/2010/main" xmlns:m="http://schemas.openxmlformats.org/officeDocument/2006/math" xmlns="" val="1"/>
             </a:ext>
           </a:extLst>
         </p:spPr>
@@ -4799,7 +4799,7 @@
           </a:ln>
           <a:extLst>
             <a:ext uri="{C572A759-6A51-4108-AA02-DFA0A04FC94B}">
-              <ma14:wrappingTextBoxFlag xmlns="" xmlns:m="http://schemas.openxmlformats.org/officeDocument/2006/math" xmlns:a14="http://schemas.microsoft.com/office/drawing/2010/main" xmlns:ma14="http://schemas.microsoft.com/office/mac/drawingml/2011/main" val="1"/>
+              <ma14:wrappingTextBoxFlag xmlns:ma14="http://schemas.microsoft.com/office/mac/drawingml/2011/main" xmlns:a14="http://schemas.microsoft.com/office/drawing/2010/main" xmlns:m="http://schemas.openxmlformats.org/officeDocument/2006/math" xmlns="" val="1"/>
             </a:ext>
           </a:extLst>
         </p:spPr>
@@ -5666,7 +5666,7 @@
             <a:effectLst/>
             <a:extLst>
               <a:ext uri="{C572A759-6A51-4108-AA02-DFA0A04FC94B}">
-                <ma14:wrappingTextBoxFlag xmlns="" xmlns:m="http://schemas.openxmlformats.org/officeDocument/2006/math" xmlns:a14="http://schemas.microsoft.com/office/drawing/2010/main" xmlns:ma14="http://schemas.microsoft.com/office/mac/drawingml/2011/main" val="1"/>
+                <ma14:wrappingTextBoxFlag xmlns:ma14="http://schemas.microsoft.com/office/mac/drawingml/2011/main" xmlns:a14="http://schemas.microsoft.com/office/drawing/2010/main" xmlns:m="http://schemas.openxmlformats.org/officeDocument/2006/math" xmlns="" val="1"/>
               </a:ext>
             </a:extLst>
           </p:spPr>
@@ -5719,7 +5719,7 @@
           </a:ln>
           <a:extLst>
             <a:ext uri="{C572A759-6A51-4108-AA02-DFA0A04FC94B}">
-              <ma14:wrappingTextBoxFlag xmlns="" xmlns:m="http://schemas.openxmlformats.org/officeDocument/2006/math" xmlns:a14="http://schemas.microsoft.com/office/drawing/2010/main" xmlns:ma14="http://schemas.microsoft.com/office/mac/drawingml/2011/main" val="1"/>
+              <ma14:wrappingTextBoxFlag xmlns:ma14="http://schemas.microsoft.com/office/mac/drawingml/2011/main" xmlns:a14="http://schemas.microsoft.com/office/drawing/2010/main" xmlns:m="http://schemas.openxmlformats.org/officeDocument/2006/math" xmlns="" val="1"/>
             </a:ext>
           </a:extLst>
         </p:spPr>
@@ -5756,7 +5756,7 @@
           </a:ln>
           <a:extLst>
             <a:ext uri="{C572A759-6A51-4108-AA02-DFA0A04FC94B}">
-              <ma14:wrappingTextBoxFlag xmlns="" xmlns:m="http://schemas.openxmlformats.org/officeDocument/2006/math" xmlns:a14="http://schemas.microsoft.com/office/drawing/2010/main" xmlns:ma14="http://schemas.microsoft.com/office/mac/drawingml/2011/main" val="1"/>
+              <ma14:wrappingTextBoxFlag xmlns:ma14="http://schemas.microsoft.com/office/mac/drawingml/2011/main" xmlns:a14="http://schemas.microsoft.com/office/drawing/2010/main" xmlns:m="http://schemas.openxmlformats.org/officeDocument/2006/math" xmlns="" val="1"/>
             </a:ext>
           </a:extLst>
         </p:spPr>
@@ -6695,7 +6695,7 @@
           </a:prstGeom>
           <a:extLst>
             <a:ext uri="{C572A759-6A51-4108-AA02-DFA0A04FC94B}">
-              <ma14:wrappingTextBoxFlag xmlns="" xmlns:m="http://schemas.openxmlformats.org/officeDocument/2006/math" xmlns:a14="http://schemas.microsoft.com/office/drawing/2010/main" xmlns:ma14="http://schemas.microsoft.com/office/mac/drawingml/2011/main" val="1"/>
+              <ma14:wrappingTextBoxFlag xmlns:ma14="http://schemas.microsoft.com/office/mac/drawingml/2011/main" xmlns:a14="http://schemas.microsoft.com/office/drawing/2010/main" xmlns:m="http://schemas.openxmlformats.org/officeDocument/2006/math" xmlns="" val="1"/>
             </a:ext>
           </a:extLst>
         </p:spPr>
@@ -6871,7 +6871,7 @@
           </a:prstGeom>
           <a:extLst>
             <a:ext uri="{C572A759-6A51-4108-AA02-DFA0A04FC94B}">
-              <ma14:wrappingTextBoxFlag xmlns="" xmlns:m="http://schemas.openxmlformats.org/officeDocument/2006/math" xmlns:a14="http://schemas.microsoft.com/office/drawing/2010/main" xmlns:ma14="http://schemas.microsoft.com/office/mac/drawingml/2011/main" val="1"/>
+              <ma14:wrappingTextBoxFlag xmlns:ma14="http://schemas.microsoft.com/office/mac/drawingml/2011/main" xmlns:a14="http://schemas.microsoft.com/office/drawing/2010/main" xmlns:m="http://schemas.openxmlformats.org/officeDocument/2006/math" xmlns="" val="1"/>
             </a:ext>
           </a:extLst>
         </p:spPr>
@@ -8410,7 +8410,7 @@
           </a:prstGeom>
           <a:extLst>
             <a:ext uri="{C572A759-6A51-4108-AA02-DFA0A04FC94B}">
-              <ma14:wrappingTextBoxFlag xmlns="" xmlns:m="http://schemas.openxmlformats.org/officeDocument/2006/math" xmlns:a14="http://schemas.microsoft.com/office/drawing/2010/main" xmlns:ma14="http://schemas.microsoft.com/office/mac/drawingml/2011/main" val="1"/>
+              <ma14:wrappingTextBoxFlag xmlns:ma14="http://schemas.microsoft.com/office/mac/drawingml/2011/main" xmlns:a14="http://schemas.microsoft.com/office/drawing/2010/main" xmlns:m="http://schemas.openxmlformats.org/officeDocument/2006/math" xmlns="" val="1"/>
             </a:ext>
           </a:extLst>
         </p:spPr>
@@ -11718,7 +11718,7 @@
           </a:prstGeom>
           <a:extLst>
             <a:ext uri="{C572A759-6A51-4108-AA02-DFA0A04FC94B}">
-              <ma14:wrappingTextBoxFlag xmlns="" xmlns:m="http://schemas.openxmlformats.org/officeDocument/2006/math" xmlns:a14="http://schemas.microsoft.com/office/drawing/2010/main" xmlns:ma14="http://schemas.microsoft.com/office/mac/drawingml/2011/main" val="1"/>
+              <ma14:wrappingTextBoxFlag xmlns:ma14="http://schemas.microsoft.com/office/mac/drawingml/2011/main" xmlns:a14="http://schemas.microsoft.com/office/drawing/2010/main" xmlns:m="http://schemas.openxmlformats.org/officeDocument/2006/math" xmlns="" val="1"/>
             </a:ext>
           </a:extLst>
         </p:spPr>
@@ -11905,7 +11905,7 @@
           </a:prstGeom>
           <a:extLst>
             <a:ext uri="{C572A759-6A51-4108-AA02-DFA0A04FC94B}">
-              <ma14:wrappingTextBoxFlag xmlns="" xmlns:m="http://schemas.openxmlformats.org/officeDocument/2006/math" xmlns:a14="http://schemas.microsoft.com/office/drawing/2010/main" xmlns:ma14="http://schemas.microsoft.com/office/mac/drawingml/2011/main" val="1"/>
+              <ma14:wrappingTextBoxFlag xmlns:ma14="http://schemas.microsoft.com/office/mac/drawingml/2011/main" xmlns:a14="http://schemas.microsoft.com/office/drawing/2010/main" xmlns:m="http://schemas.openxmlformats.org/officeDocument/2006/math" xmlns="" val="1"/>
             </a:ext>
           </a:extLst>
         </p:spPr>
@@ -12996,27 +12996,16 @@
             </a:r>
             <a:r>
               <a:rPr lang="da-DK" dirty="0"/>
-              <a:t> of guide i have </a:t>
+              <a:t> of </a:t>
             </a:r>
             <a:r>
               <a:rPr lang="da-DK" dirty="0" err="1"/>
-              <a:t>designed</a:t>
+              <a:t>optimized</a:t>
             </a:r>
             <a:r>
               <a:rPr lang="da-DK" dirty="0"/>
-              <a:t> for </a:t>
-            </a:r>
-            <a:r>
-              <a:rPr lang="da-DK" dirty="0" err="1"/>
-              <a:t>some</a:t>
-            </a:r>
-            <a:r>
-              <a:rPr lang="da-DK" dirty="0"/>
-              <a:t> ESS instrument?</a:t>
-            </a:r>
-          </a:p>
-          <a:p>
-            <a:endParaRPr lang="da-DK" dirty="0"/>
+              <a:t> guide</a:t>
+            </a:r>
           </a:p>
         </p:txBody>
       </p:sp>
@@ -13040,7 +13029,7 @@
           </a:prstGeom>
           <a:extLst>
             <a:ext uri="{C572A759-6A51-4108-AA02-DFA0A04FC94B}">
-              <ma14:wrappingTextBoxFlag xmlns="" xmlns:m="http://schemas.openxmlformats.org/officeDocument/2006/math" xmlns:a14="http://schemas.microsoft.com/office/drawing/2010/main" xmlns:ma14="http://schemas.microsoft.com/office/mac/drawingml/2011/main" val="1"/>
+              <ma14:wrappingTextBoxFlag xmlns:ma14="http://schemas.microsoft.com/office/mac/drawingml/2011/main" xmlns:a14="http://schemas.microsoft.com/office/drawing/2010/main" xmlns:m="http://schemas.openxmlformats.org/officeDocument/2006/math" xmlns="" val="1"/>
             </a:ext>
           </a:extLst>
         </p:spPr>
@@ -13435,7 +13424,7 @@
           </a:prstGeom>
           <a:extLst>
             <a:ext uri="{C572A759-6A51-4108-AA02-DFA0A04FC94B}">
-              <ma14:wrappingTextBoxFlag xmlns="" xmlns:m="http://schemas.openxmlformats.org/officeDocument/2006/math" xmlns:a14="http://schemas.microsoft.com/office/drawing/2010/main" xmlns:ma14="http://schemas.microsoft.com/office/mac/drawingml/2011/main" val="1"/>
+              <ma14:wrappingTextBoxFlag xmlns:ma14="http://schemas.microsoft.com/office/mac/drawingml/2011/main" xmlns:a14="http://schemas.microsoft.com/office/drawing/2010/main" xmlns:m="http://schemas.openxmlformats.org/officeDocument/2006/math" xmlns="" val="1"/>
             </a:ext>
           </a:extLst>
         </p:spPr>
@@ -13659,7 +13648,7 @@
           </a:prstGeom>
           <a:extLst>
             <a:ext uri="{C572A759-6A51-4108-AA02-DFA0A04FC94B}">
-              <ma14:wrappingTextBoxFlag xmlns="" xmlns:m="http://schemas.openxmlformats.org/officeDocument/2006/math" xmlns:a14="http://schemas.microsoft.com/office/drawing/2010/main" xmlns:ma14="http://schemas.microsoft.com/office/mac/drawingml/2011/main" val="1"/>
+              <ma14:wrappingTextBoxFlag xmlns:ma14="http://schemas.microsoft.com/office/mac/drawingml/2011/main" xmlns:a14="http://schemas.microsoft.com/office/drawing/2010/main" xmlns:m="http://schemas.openxmlformats.org/officeDocument/2006/math" xmlns="" val="1"/>
             </a:ext>
           </a:extLst>
         </p:spPr>
@@ -13780,7 +13769,7 @@
           </a:prstGeom>
           <a:extLst>
             <a:ext uri="{C572A759-6A51-4108-AA02-DFA0A04FC94B}">
-              <ma14:wrappingTextBoxFlag xmlns="" xmlns:m="http://schemas.openxmlformats.org/officeDocument/2006/math" xmlns:a14="http://schemas.microsoft.com/office/drawing/2010/main" xmlns:ma14="http://schemas.microsoft.com/office/mac/drawingml/2011/main" val="1"/>
+              <ma14:wrappingTextBoxFlag xmlns:ma14="http://schemas.microsoft.com/office/mac/drawingml/2011/main" xmlns:a14="http://schemas.microsoft.com/office/drawing/2010/main" xmlns:m="http://schemas.openxmlformats.org/officeDocument/2006/math" xmlns="" val="1"/>
             </a:ext>
           </a:extLst>
         </p:spPr>
@@ -14227,7 +14216,7 @@
           </a:ln>
           <a:extLst>
             <a:ext uri="{C572A759-6A51-4108-AA02-DFA0A04FC94B}">
-              <ma14:wrappingTextBoxFlag xmlns:ma14="http://schemas.microsoft.com/office/mac/drawingml/2011/main" xmlns="" val="1"/>
+              <ma14:wrappingTextBoxFlag xmlns="" xmlns:ma14="http://schemas.microsoft.com/office/mac/drawingml/2011/main" val="1"/>
             </a:ext>
           </a:extLst>
         </p:spPr>
@@ -14281,7 +14270,7 @@
           </a:ln>
           <a:extLst>
             <a:ext uri="{C572A759-6A51-4108-AA02-DFA0A04FC94B}">
-              <ma14:wrappingTextBoxFlag xmlns:ma14="http://schemas.microsoft.com/office/mac/drawingml/2011/main" xmlns="" val="1"/>
+              <ma14:wrappingTextBoxFlag xmlns="" xmlns:ma14="http://schemas.microsoft.com/office/mac/drawingml/2011/main" val="1"/>
             </a:ext>
           </a:extLst>
         </p:spPr>
@@ -14335,7 +14324,7 @@
           </a:ln>
           <a:extLst>
             <a:ext uri="{C572A759-6A51-4108-AA02-DFA0A04FC94B}">
-              <ma14:wrappingTextBoxFlag xmlns:ma14="http://schemas.microsoft.com/office/mac/drawingml/2011/main" xmlns="" val="1"/>
+              <ma14:wrappingTextBoxFlag xmlns="" xmlns:ma14="http://schemas.microsoft.com/office/mac/drawingml/2011/main" val="1"/>
             </a:ext>
           </a:extLst>
         </p:spPr>
@@ -14392,7 +14381,7 @@
           </a:ln>
           <a:extLst>
             <a:ext uri="{C572A759-6A51-4108-AA02-DFA0A04FC94B}">
-              <ma14:wrappingTextBoxFlag xmlns:ma14="http://schemas.microsoft.com/office/mac/drawingml/2011/main" xmlns="" val="1"/>
+              <ma14:wrappingTextBoxFlag xmlns="" xmlns:ma14="http://schemas.microsoft.com/office/mac/drawingml/2011/main" val="1"/>
             </a:ext>
           </a:extLst>
         </p:spPr>
@@ -14493,7 +14482,7 @@
           </a:ln>
           <a:extLst>
             <a:ext uri="{C572A759-6A51-4108-AA02-DFA0A04FC94B}">
-              <ma14:wrappingTextBoxFlag xmlns:ma14="http://schemas.microsoft.com/office/mac/drawingml/2011/main" xmlns="" val="1"/>
+              <ma14:wrappingTextBoxFlag xmlns="" xmlns:ma14="http://schemas.microsoft.com/office/mac/drawingml/2011/main" val="1"/>
             </a:ext>
           </a:extLst>
         </p:spPr>
@@ -14697,7 +14686,7 @@
           </a:prstGeom>
           <a:extLst>
             <a:ext uri="{C572A759-6A51-4108-AA02-DFA0A04FC94B}">
-              <ma14:wrappingTextBoxFlag xmlns="" xmlns:m="http://schemas.openxmlformats.org/officeDocument/2006/math" xmlns:a14="http://schemas.microsoft.com/office/drawing/2010/main" xmlns:ma14="http://schemas.microsoft.com/office/mac/drawingml/2011/main" val="1"/>
+              <ma14:wrappingTextBoxFlag xmlns:ma14="http://schemas.microsoft.com/office/mac/drawingml/2011/main" xmlns:a14="http://schemas.microsoft.com/office/drawing/2010/main" xmlns:m="http://schemas.openxmlformats.org/officeDocument/2006/math" xmlns="" val="1"/>
             </a:ext>
           </a:extLst>
         </p:spPr>
@@ -15188,7 +15177,7 @@
           </a:ln>
           <a:extLst>
             <a:ext uri="{C572A759-6A51-4108-AA02-DFA0A04FC94B}">
-              <ma14:wrappingTextBoxFlag xmlns:ma14="http://schemas.microsoft.com/office/mac/drawingml/2011/main" xmlns="" val="1"/>
+              <ma14:wrappingTextBoxFlag xmlns="" xmlns:ma14="http://schemas.microsoft.com/office/mac/drawingml/2011/main" val="1"/>
             </a:ext>
           </a:extLst>
         </p:spPr>
@@ -15242,7 +15231,7 @@
           </a:ln>
           <a:extLst>
             <a:ext uri="{C572A759-6A51-4108-AA02-DFA0A04FC94B}">
-              <ma14:wrappingTextBoxFlag xmlns:ma14="http://schemas.microsoft.com/office/mac/drawingml/2011/main" xmlns="" val="1"/>
+              <ma14:wrappingTextBoxFlag xmlns="" xmlns:ma14="http://schemas.microsoft.com/office/mac/drawingml/2011/main" val="1"/>
             </a:ext>
           </a:extLst>
         </p:spPr>
@@ -15296,7 +15285,7 @@
           </a:ln>
           <a:extLst>
             <a:ext uri="{C572A759-6A51-4108-AA02-DFA0A04FC94B}">
-              <ma14:wrappingTextBoxFlag xmlns:ma14="http://schemas.microsoft.com/office/mac/drawingml/2011/main" xmlns="" val="1"/>
+              <ma14:wrappingTextBoxFlag xmlns="" xmlns:ma14="http://schemas.microsoft.com/office/mac/drawingml/2011/main" val="1"/>
             </a:ext>
           </a:extLst>
         </p:spPr>
@@ -15353,7 +15342,7 @@
           </a:ln>
           <a:extLst>
             <a:ext uri="{C572A759-6A51-4108-AA02-DFA0A04FC94B}">
-              <ma14:wrappingTextBoxFlag xmlns:ma14="http://schemas.microsoft.com/office/mac/drawingml/2011/main" xmlns="" val="1"/>
+              <ma14:wrappingTextBoxFlag xmlns="" xmlns:ma14="http://schemas.microsoft.com/office/mac/drawingml/2011/main" val="1"/>
             </a:ext>
           </a:extLst>
         </p:spPr>
@@ -15454,7 +15443,7 @@
           </a:ln>
           <a:extLst>
             <a:ext uri="{C572A759-6A51-4108-AA02-DFA0A04FC94B}">
-              <ma14:wrappingTextBoxFlag xmlns:ma14="http://schemas.microsoft.com/office/mac/drawingml/2011/main" xmlns="" val="1"/>
+              <ma14:wrappingTextBoxFlag xmlns="" xmlns:ma14="http://schemas.microsoft.com/office/mac/drawingml/2011/main" val="1"/>
             </a:ext>
           </a:extLst>
         </p:spPr>
@@ -15645,7 +15634,7 @@
           </a:prstGeom>
           <a:extLst>
             <a:ext uri="{C572A759-6A51-4108-AA02-DFA0A04FC94B}">
-              <ma14:wrappingTextBoxFlag xmlns="" xmlns:m="http://schemas.openxmlformats.org/officeDocument/2006/math" xmlns:a14="http://schemas.microsoft.com/office/drawing/2010/main" xmlns:ma14="http://schemas.microsoft.com/office/mac/drawingml/2011/main" val="1"/>
+              <ma14:wrappingTextBoxFlag xmlns:ma14="http://schemas.microsoft.com/office/mac/drawingml/2011/main" xmlns:a14="http://schemas.microsoft.com/office/drawing/2010/main" xmlns:m="http://schemas.openxmlformats.org/officeDocument/2006/math" xmlns="" val="1"/>
             </a:ext>
           </a:extLst>
         </p:spPr>
@@ -16094,7 +16083,7 @@
           </a:ln>
           <a:extLst>
             <a:ext uri="{C572A759-6A51-4108-AA02-DFA0A04FC94B}">
-              <ma14:wrappingTextBoxFlag xmlns:ma14="http://schemas.microsoft.com/office/mac/drawingml/2011/main" xmlns="" val="1"/>
+              <ma14:wrappingTextBoxFlag xmlns="" xmlns:ma14="http://schemas.microsoft.com/office/mac/drawingml/2011/main" val="1"/>
             </a:ext>
           </a:extLst>
         </p:spPr>
@@ -16148,7 +16137,7 @@
           </a:ln>
           <a:extLst>
             <a:ext uri="{C572A759-6A51-4108-AA02-DFA0A04FC94B}">
-              <ma14:wrappingTextBoxFlag xmlns:ma14="http://schemas.microsoft.com/office/mac/drawingml/2011/main" xmlns="" val="1"/>
+              <ma14:wrappingTextBoxFlag xmlns="" xmlns:ma14="http://schemas.microsoft.com/office/mac/drawingml/2011/main" val="1"/>
             </a:ext>
           </a:extLst>
         </p:spPr>
@@ -16202,7 +16191,7 @@
           </a:ln>
           <a:extLst>
             <a:ext uri="{C572A759-6A51-4108-AA02-DFA0A04FC94B}">
-              <ma14:wrappingTextBoxFlag xmlns:ma14="http://schemas.microsoft.com/office/mac/drawingml/2011/main" xmlns="" val="1"/>
+              <ma14:wrappingTextBoxFlag xmlns="" xmlns:ma14="http://schemas.microsoft.com/office/mac/drawingml/2011/main" val="1"/>
             </a:ext>
           </a:extLst>
         </p:spPr>
@@ -16259,7 +16248,7 @@
           </a:ln>
           <a:extLst>
             <a:ext uri="{C572A759-6A51-4108-AA02-DFA0A04FC94B}">
-              <ma14:wrappingTextBoxFlag xmlns:ma14="http://schemas.microsoft.com/office/mac/drawingml/2011/main" xmlns="" val="1"/>
+              <ma14:wrappingTextBoxFlag xmlns="" xmlns:ma14="http://schemas.microsoft.com/office/mac/drawingml/2011/main" val="1"/>
             </a:ext>
           </a:extLst>
         </p:spPr>
@@ -16360,7 +16349,7 @@
           </a:ln>
           <a:extLst>
             <a:ext uri="{C572A759-6A51-4108-AA02-DFA0A04FC94B}">
-              <ma14:wrappingTextBoxFlag xmlns:ma14="http://schemas.microsoft.com/office/mac/drawingml/2011/main" xmlns="" val="1"/>
+              <ma14:wrappingTextBoxFlag xmlns="" xmlns:ma14="http://schemas.microsoft.com/office/mac/drawingml/2011/main" val="1"/>
             </a:ext>
           </a:extLst>
         </p:spPr>
@@ -16631,7 +16620,7 @@
           </a:prstGeom>
           <a:extLst>
             <a:ext uri="{C572A759-6A51-4108-AA02-DFA0A04FC94B}">
-              <ma14:wrappingTextBoxFlag xmlns="" xmlns:m="http://schemas.openxmlformats.org/officeDocument/2006/math" xmlns:a14="http://schemas.microsoft.com/office/drawing/2010/main" xmlns:ma14="http://schemas.microsoft.com/office/mac/drawingml/2011/main" val="1"/>
+              <ma14:wrappingTextBoxFlag xmlns:ma14="http://schemas.microsoft.com/office/mac/drawingml/2011/main" xmlns:a14="http://schemas.microsoft.com/office/drawing/2010/main" xmlns:m="http://schemas.openxmlformats.org/officeDocument/2006/math" xmlns="" val="1"/>
             </a:ext>
           </a:extLst>
         </p:spPr>
@@ -17169,7 +17158,7 @@
           </a:ln>
           <a:extLst>
             <a:ext uri="{C572A759-6A51-4108-AA02-DFA0A04FC94B}">
-              <ma14:wrappingTextBoxFlag xmlns:ma14="http://schemas.microsoft.com/office/mac/drawingml/2011/main" xmlns="" val="1"/>
+              <ma14:wrappingTextBoxFlag xmlns="" xmlns:ma14="http://schemas.microsoft.com/office/mac/drawingml/2011/main" val="1"/>
             </a:ext>
           </a:extLst>
         </p:spPr>
@@ -17223,7 +17212,7 @@
           </a:ln>
           <a:extLst>
             <a:ext uri="{C572A759-6A51-4108-AA02-DFA0A04FC94B}">
-              <ma14:wrappingTextBoxFlag xmlns:ma14="http://schemas.microsoft.com/office/mac/drawingml/2011/main" xmlns="" val="1"/>
+              <ma14:wrappingTextBoxFlag xmlns="" xmlns:ma14="http://schemas.microsoft.com/office/mac/drawingml/2011/main" val="1"/>
             </a:ext>
           </a:extLst>
         </p:spPr>
@@ -17277,7 +17266,7 @@
           </a:ln>
           <a:extLst>
             <a:ext uri="{C572A759-6A51-4108-AA02-DFA0A04FC94B}">
-              <ma14:wrappingTextBoxFlag xmlns:ma14="http://schemas.microsoft.com/office/mac/drawingml/2011/main" xmlns="" val="1"/>
+              <ma14:wrappingTextBoxFlag xmlns="" xmlns:ma14="http://schemas.microsoft.com/office/mac/drawingml/2011/main" val="1"/>
             </a:ext>
           </a:extLst>
         </p:spPr>
@@ -17334,7 +17323,7 @@
           </a:ln>
           <a:extLst>
             <a:ext uri="{C572A759-6A51-4108-AA02-DFA0A04FC94B}">
-              <ma14:wrappingTextBoxFlag xmlns:ma14="http://schemas.microsoft.com/office/mac/drawingml/2011/main" xmlns="" val="1"/>
+              <ma14:wrappingTextBoxFlag xmlns="" xmlns:ma14="http://schemas.microsoft.com/office/mac/drawingml/2011/main" val="1"/>
             </a:ext>
           </a:extLst>
         </p:spPr>
@@ -17435,7 +17424,7 @@
           </a:ln>
           <a:extLst>
             <a:ext uri="{C572A759-6A51-4108-AA02-DFA0A04FC94B}">
-              <ma14:wrappingTextBoxFlag xmlns:ma14="http://schemas.microsoft.com/office/mac/drawingml/2011/main" xmlns="" val="1"/>
+              <ma14:wrappingTextBoxFlag xmlns="" xmlns:ma14="http://schemas.microsoft.com/office/mac/drawingml/2011/main" val="1"/>
             </a:ext>
           </a:extLst>
         </p:spPr>
@@ -17713,7 +17702,7 @@
           </a:prstGeom>
           <a:extLst>
             <a:ext uri="{C572A759-6A51-4108-AA02-DFA0A04FC94B}">
-              <ma14:wrappingTextBoxFlag xmlns="" xmlns:m="http://schemas.openxmlformats.org/officeDocument/2006/math" xmlns:a14="http://schemas.microsoft.com/office/drawing/2010/main" xmlns:ma14="http://schemas.microsoft.com/office/mac/drawingml/2011/main" val="1"/>
+              <ma14:wrappingTextBoxFlag xmlns:ma14="http://schemas.microsoft.com/office/mac/drawingml/2011/main" xmlns:a14="http://schemas.microsoft.com/office/drawing/2010/main" xmlns:m="http://schemas.openxmlformats.org/officeDocument/2006/math" xmlns="" val="1"/>
             </a:ext>
           </a:extLst>
         </p:spPr>
@@ -18126,7 +18115,7 @@
             <a:effectLst/>
             <a:extLst>
               <a:ext uri="{C572A759-6A51-4108-AA02-DFA0A04FC94B}">
-                <ma14:wrappingTextBoxFlag xmlns:ma14="http://schemas.microsoft.com/office/mac/drawingml/2011/main" xmlns="" val="1"/>
+                <ma14:wrappingTextBoxFlag xmlns="" xmlns:ma14="http://schemas.microsoft.com/office/mac/drawingml/2011/main" val="1"/>
               </a:ext>
             </a:extLst>
           </p:spPr>
@@ -18180,7 +18169,7 @@
             <a:effectLst/>
             <a:extLst>
               <a:ext uri="{C572A759-6A51-4108-AA02-DFA0A04FC94B}">
-                <ma14:wrappingTextBoxFlag xmlns:ma14="http://schemas.microsoft.com/office/mac/drawingml/2011/main" xmlns="" val="1"/>
+                <ma14:wrappingTextBoxFlag xmlns="" xmlns:ma14="http://schemas.microsoft.com/office/mac/drawingml/2011/main" val="1"/>
               </a:ext>
             </a:extLst>
           </p:spPr>
@@ -18242,7 +18231,7 @@
             <a:effectLst/>
             <a:extLst>
               <a:ext uri="{C572A759-6A51-4108-AA02-DFA0A04FC94B}">
-                <ma14:wrappingTextBoxFlag xmlns:ma14="http://schemas.microsoft.com/office/mac/drawingml/2011/main" xmlns="" val="1"/>
+                <ma14:wrappingTextBoxFlag xmlns="" xmlns:ma14="http://schemas.microsoft.com/office/mac/drawingml/2011/main" val="1"/>
               </a:ext>
             </a:extLst>
           </p:spPr>
@@ -18353,7 +18342,7 @@
             <a:effectLst/>
             <a:extLst>
               <a:ext uri="{C572A759-6A51-4108-AA02-DFA0A04FC94B}">
-                <ma14:wrappingTextBoxFlag xmlns:ma14="http://schemas.microsoft.com/office/mac/drawingml/2011/main" xmlns="" val="1"/>
+                <ma14:wrappingTextBoxFlag xmlns="" xmlns:ma14="http://schemas.microsoft.com/office/mac/drawingml/2011/main" val="1"/>
               </a:ext>
             </a:extLst>
           </p:spPr>
@@ -18513,7 +18502,7 @@
             <a:effectLst/>
             <a:extLst>
               <a:ext uri="{C572A759-6A51-4108-AA02-DFA0A04FC94B}">
-                <ma14:wrappingTextBoxFlag xmlns:ma14="http://schemas.microsoft.com/office/mac/drawingml/2011/main" xmlns="" val="1"/>
+                <ma14:wrappingTextBoxFlag xmlns="" xmlns:ma14="http://schemas.microsoft.com/office/mac/drawingml/2011/main" val="1"/>
               </a:ext>
             </a:extLst>
           </p:spPr>
@@ -18804,7 +18793,7 @@
           </a:prstGeom>
           <a:extLst>
             <a:ext uri="{C572A759-6A51-4108-AA02-DFA0A04FC94B}">
-              <ma14:wrappingTextBoxFlag xmlns="" xmlns:m="http://schemas.openxmlformats.org/officeDocument/2006/math" xmlns:a14="http://schemas.microsoft.com/office/drawing/2010/main" xmlns:ma14="http://schemas.microsoft.com/office/mac/drawingml/2011/main" val="1"/>
+              <ma14:wrappingTextBoxFlag xmlns:ma14="http://schemas.microsoft.com/office/mac/drawingml/2011/main" xmlns:a14="http://schemas.microsoft.com/office/drawing/2010/main" xmlns:m="http://schemas.openxmlformats.org/officeDocument/2006/math" xmlns="" val="1"/>
             </a:ext>
           </a:extLst>
         </p:spPr>
@@ -18908,7 +18897,7 @@
             <p:spPr>
               <a:xfrm>
                 <a:off x="10360059" y="3176833"/>
-                <a:ext cx="1471356" cy="969496"/>
+                <a:ext cx="1471356" cy="1577355"/>
               </a:xfrm>
               <a:prstGeom prst="rect">
                 <a:avLst/>
@@ -19080,6 +19069,45 @@
                   <a:rPr lang="da-DK" dirty="0" err="1"/>
                   <a:t>matters</a:t>
                 </a:r>
+                <a:endParaRPr lang="da-DK" dirty="0"/>
+              </a:p>
+              <a:p>
+                <a:pPr marL="0" marR="0" indent="0" algn="l" defTabSz="914400" rtl="0" fontAlgn="auto" latinLnBrk="0" hangingPunct="0">
+                  <a:lnSpc>
+                    <a:spcPct val="100000"/>
+                  </a:lnSpc>
+                  <a:spcBef>
+                    <a:spcPts val="900"/>
+                  </a:spcBef>
+                  <a:spcAft>
+                    <a:spcPts val="0"/>
+                  </a:spcAft>
+                  <a:buClrTx/>
+                  <a:buSzTx/>
+                  <a:buFontTx/>
+                  <a:buNone/>
+                  <a:tabLst/>
+                </a:pPr>
+                <a:r>
+                  <a:rPr lang="da-DK" dirty="0" err="1"/>
+                  <a:t>Better</a:t>
+                </a:r>
+                <a:r>
+                  <a:rPr lang="da-DK" dirty="0"/>
+                  <a:t> mirrors </a:t>
+                </a:r>
+                <a:r>
+                  <a:rPr lang="da-DK" dirty="0" err="1"/>
+                  <a:t>available</a:t>
+                </a:r>
+                <a:r>
+                  <a:rPr lang="da-DK" dirty="0"/>
+                  <a:t> </a:t>
+                </a:r>
+                <a:r>
+                  <a:rPr lang="da-DK" dirty="0" err="1"/>
+                  <a:t>today</a:t>
+                </a:r>
                 <a:endParaRPr kumimoji="0" lang="da-DK" sz="1600" b="0" i="0" u="none" strike="noStrike" cap="none" spc="0" normalizeH="0" baseline="0" dirty="0">
                   <a:ln>
                     <a:noFill/>
@@ -19116,7 +19144,7 @@
             <p:spPr>
               <a:xfrm>
                 <a:off x="10360059" y="3176833"/>
-                <a:ext cx="1471356" cy="969496"/>
+                <a:ext cx="1471356" cy="1577355"/>
               </a:xfrm>
               <a:prstGeom prst="rect">
                 <a:avLst/>
@@ -19124,7 +19152,7 @@
               <a:blipFill>
                 <a:blip r:embed="rId5"/>
                 <a:stretch>
-                  <a:fillRect l="-9483" r="-1724" b="-12987"/>
+                  <a:fillRect l="-9483" r="-1724" b="-7200"/>
                 </a:stretch>
               </a:blipFill>
               <a:ln w="12700" cap="flat">
@@ -19184,8 +19212,8 @@
           </a:prstGeom>
         </p:spPr>
       </p:pic>
-      <mc:AlternateContent xmlns:mc="http://schemas.openxmlformats.org/markup-compatibility/2006">
-        <mc:Choice xmlns:a14="http://schemas.microsoft.com/office/drawing/2010/main" Requires="a14">
+      <mc:AlternateContent xmlns:mc="http://schemas.openxmlformats.org/markup-compatibility/2006" xmlns:a14="http://schemas.microsoft.com/office/drawing/2010/main">
+        <mc:Choice Requires="a14">
           <p:sp>
             <p:nvSpPr>
               <p:cNvPr id="12" name="TextBox 11">
@@ -19316,7 +19344,7 @@
             </p:txBody>
           </p:sp>
         </mc:Choice>
-        <mc:Fallback>
+        <mc:Fallback xmlns="">
           <p:sp>
             <p:nvSpPr>
               <p:cNvPr id="12" name="TextBox 11">
@@ -19366,8 +19394,8 @@
           </p:sp>
         </mc:Fallback>
       </mc:AlternateContent>
-      <mc:AlternateContent xmlns:mc="http://schemas.openxmlformats.org/markup-compatibility/2006">
-        <mc:Choice xmlns:a14="http://schemas.microsoft.com/office/drawing/2010/main" Requires="a14">
+      <mc:AlternateContent xmlns:mc="http://schemas.openxmlformats.org/markup-compatibility/2006" xmlns:a14="http://schemas.microsoft.com/office/drawing/2010/main">
+        <mc:Choice Requires="a14">
           <p:sp>
             <p:nvSpPr>
               <p:cNvPr id="16" name="TextBox 15">
@@ -19554,7 +19582,7 @@
             </p:txBody>
           </p:sp>
         </mc:Choice>
-        <mc:Fallback>
+        <mc:Fallback xmlns="">
           <p:sp>
             <p:nvSpPr>
               <p:cNvPr id="16" name="TextBox 15">
@@ -19847,7 +19875,7 @@
           </a:prstGeom>
           <a:extLst>
             <a:ext uri="{C572A759-6A51-4108-AA02-DFA0A04FC94B}">
-              <ma14:wrappingTextBoxFlag xmlns="" xmlns:m="http://schemas.openxmlformats.org/officeDocument/2006/math" xmlns:a14="http://schemas.microsoft.com/office/drawing/2010/main" xmlns:ma14="http://schemas.microsoft.com/office/mac/drawingml/2011/main" val="1"/>
+              <ma14:wrappingTextBoxFlag xmlns:ma14="http://schemas.microsoft.com/office/mac/drawingml/2011/main" xmlns:a14="http://schemas.microsoft.com/office/drawing/2010/main" xmlns:m="http://schemas.openxmlformats.org/officeDocument/2006/math" xmlns="" val="1"/>
             </a:ext>
           </a:extLst>
         </p:spPr>

</xml_diff>

<commit_message>
Slight update to guide talk
</commit_message>
<xml_diff>
--- a/CSNS_March_2019/2_Tuesday_March_26th/2_guides/guide_intro_talk.pptx
+++ b/CSNS_March_2019/2_Tuesday_March_26th/2_guides/guide_intro_talk.pptx
@@ -1804,7 +1804,7 @@
           </a:ln>
           <a:extLst>
             <a:ext uri="{C572A759-6A51-4108-AA02-DFA0A04FC94B}">
-              <ma14:wrappingTextBoxFlag xmlns="" xmlns:m="http://schemas.openxmlformats.org/officeDocument/2006/math" xmlns:a14="http://schemas.microsoft.com/office/drawing/2010/main" xmlns:ma14="http://schemas.microsoft.com/office/mac/drawingml/2011/main" val="1"/>
+              <ma14:wrappingTextBoxFlag xmlns:ma14="http://schemas.microsoft.com/office/mac/drawingml/2011/main" xmlns:a14="http://schemas.microsoft.com/office/drawing/2010/main" xmlns:m="http://schemas.openxmlformats.org/officeDocument/2006/math" xmlns="" val="1"/>
             </a:ext>
           </a:extLst>
         </p:spPr>
@@ -1850,7 +1850,7 @@
           </a:ln>
           <a:extLst>
             <a:ext uri="{C572A759-6A51-4108-AA02-DFA0A04FC94B}">
-              <ma14:wrappingTextBoxFlag xmlns="" xmlns:m="http://schemas.openxmlformats.org/officeDocument/2006/math" xmlns:a14="http://schemas.microsoft.com/office/drawing/2010/main" xmlns:ma14="http://schemas.microsoft.com/office/mac/drawingml/2011/main" val="1"/>
+              <ma14:wrappingTextBoxFlag xmlns:ma14="http://schemas.microsoft.com/office/mac/drawingml/2011/main" xmlns:a14="http://schemas.microsoft.com/office/drawing/2010/main" xmlns:m="http://schemas.openxmlformats.org/officeDocument/2006/math" xmlns="" val="1"/>
             </a:ext>
           </a:extLst>
         </p:spPr>
@@ -2838,7 +2838,7 @@
             <a:effectLst/>
             <a:extLst>
               <a:ext uri="{C572A759-6A51-4108-AA02-DFA0A04FC94B}">
-                <ma14:wrappingTextBoxFlag xmlns="" xmlns:m="http://schemas.openxmlformats.org/officeDocument/2006/math" xmlns:a14="http://schemas.microsoft.com/office/drawing/2010/main" xmlns:ma14="http://schemas.microsoft.com/office/mac/drawingml/2011/main" val="1"/>
+                <ma14:wrappingTextBoxFlag xmlns:ma14="http://schemas.microsoft.com/office/mac/drawingml/2011/main" xmlns:a14="http://schemas.microsoft.com/office/drawing/2010/main" xmlns:m="http://schemas.openxmlformats.org/officeDocument/2006/math" xmlns="" val="1"/>
               </a:ext>
             </a:extLst>
           </p:spPr>
@@ -3436,7 +3436,7 @@
           </a:ln>
           <a:extLst>
             <a:ext uri="{C572A759-6A51-4108-AA02-DFA0A04FC94B}">
-              <ma14:wrappingTextBoxFlag xmlns="" xmlns:m="http://schemas.openxmlformats.org/officeDocument/2006/math" xmlns:a14="http://schemas.microsoft.com/office/drawing/2010/main" xmlns:ma14="http://schemas.microsoft.com/office/mac/drawingml/2011/main" val="1"/>
+              <ma14:wrappingTextBoxFlag xmlns:ma14="http://schemas.microsoft.com/office/mac/drawingml/2011/main" xmlns:a14="http://schemas.microsoft.com/office/drawing/2010/main" xmlns:m="http://schemas.openxmlformats.org/officeDocument/2006/math" xmlns="" val="1"/>
             </a:ext>
           </a:extLst>
         </p:spPr>
@@ -3482,7 +3482,7 @@
           </a:ln>
           <a:extLst>
             <a:ext uri="{C572A759-6A51-4108-AA02-DFA0A04FC94B}">
-              <ma14:wrappingTextBoxFlag xmlns="" xmlns:m="http://schemas.openxmlformats.org/officeDocument/2006/math" xmlns:a14="http://schemas.microsoft.com/office/drawing/2010/main" xmlns:ma14="http://schemas.microsoft.com/office/mac/drawingml/2011/main" val="1"/>
+              <ma14:wrappingTextBoxFlag xmlns:ma14="http://schemas.microsoft.com/office/mac/drawingml/2011/main" xmlns:a14="http://schemas.microsoft.com/office/drawing/2010/main" xmlns:m="http://schemas.openxmlformats.org/officeDocument/2006/math" xmlns="" val="1"/>
             </a:ext>
           </a:extLst>
         </p:spPr>
@@ -4386,7 +4386,7 @@
             <a:effectLst/>
             <a:extLst>
               <a:ext uri="{C572A759-6A51-4108-AA02-DFA0A04FC94B}">
-                <ma14:wrappingTextBoxFlag xmlns="" xmlns:m="http://schemas.openxmlformats.org/officeDocument/2006/math" xmlns:a14="http://schemas.microsoft.com/office/drawing/2010/main" xmlns:ma14="http://schemas.microsoft.com/office/mac/drawingml/2011/main" val="1"/>
+                <ma14:wrappingTextBoxFlag xmlns:ma14="http://schemas.microsoft.com/office/mac/drawingml/2011/main" xmlns:a14="http://schemas.microsoft.com/office/drawing/2010/main" xmlns:m="http://schemas.openxmlformats.org/officeDocument/2006/math" xmlns="" val="1"/>
               </a:ext>
             </a:extLst>
           </p:spPr>
@@ -5021,7 +5021,7 @@
           </a:ln>
           <a:extLst>
             <a:ext uri="{C572A759-6A51-4108-AA02-DFA0A04FC94B}">
-              <ma14:wrappingTextBoxFlag xmlns="" xmlns:m="http://schemas.openxmlformats.org/officeDocument/2006/math" xmlns:a14="http://schemas.microsoft.com/office/drawing/2010/main" xmlns:ma14="http://schemas.microsoft.com/office/mac/drawingml/2011/main" val="1"/>
+              <ma14:wrappingTextBoxFlag xmlns:ma14="http://schemas.microsoft.com/office/mac/drawingml/2011/main" xmlns:a14="http://schemas.microsoft.com/office/drawing/2010/main" xmlns:m="http://schemas.openxmlformats.org/officeDocument/2006/math" xmlns="" val="1"/>
             </a:ext>
           </a:extLst>
         </p:spPr>
@@ -5067,7 +5067,7 @@
           </a:ln>
           <a:extLst>
             <a:ext uri="{C572A759-6A51-4108-AA02-DFA0A04FC94B}">
-              <ma14:wrappingTextBoxFlag xmlns="" xmlns:m="http://schemas.openxmlformats.org/officeDocument/2006/math" xmlns:a14="http://schemas.microsoft.com/office/drawing/2010/main" xmlns:ma14="http://schemas.microsoft.com/office/mac/drawingml/2011/main" val="1"/>
+              <ma14:wrappingTextBoxFlag xmlns:ma14="http://schemas.microsoft.com/office/mac/drawingml/2011/main" xmlns:a14="http://schemas.microsoft.com/office/drawing/2010/main" xmlns:m="http://schemas.openxmlformats.org/officeDocument/2006/math" xmlns="" val="1"/>
             </a:ext>
           </a:extLst>
         </p:spPr>
@@ -5934,7 +5934,7 @@
             <a:effectLst/>
             <a:extLst>
               <a:ext uri="{C572A759-6A51-4108-AA02-DFA0A04FC94B}">
-                <ma14:wrappingTextBoxFlag xmlns="" xmlns:m="http://schemas.openxmlformats.org/officeDocument/2006/math" xmlns:a14="http://schemas.microsoft.com/office/drawing/2010/main" xmlns:ma14="http://schemas.microsoft.com/office/mac/drawingml/2011/main" val="1"/>
+                <ma14:wrappingTextBoxFlag xmlns:ma14="http://schemas.microsoft.com/office/mac/drawingml/2011/main" xmlns:a14="http://schemas.microsoft.com/office/drawing/2010/main" xmlns:m="http://schemas.openxmlformats.org/officeDocument/2006/math" xmlns="" val="1"/>
               </a:ext>
             </a:extLst>
           </p:spPr>
@@ -5987,7 +5987,7 @@
           </a:ln>
           <a:extLst>
             <a:ext uri="{C572A759-6A51-4108-AA02-DFA0A04FC94B}">
-              <ma14:wrappingTextBoxFlag xmlns="" xmlns:m="http://schemas.openxmlformats.org/officeDocument/2006/math" xmlns:a14="http://schemas.microsoft.com/office/drawing/2010/main" xmlns:ma14="http://schemas.microsoft.com/office/mac/drawingml/2011/main" val="1"/>
+              <ma14:wrappingTextBoxFlag xmlns:ma14="http://schemas.microsoft.com/office/mac/drawingml/2011/main" xmlns:a14="http://schemas.microsoft.com/office/drawing/2010/main" xmlns:m="http://schemas.openxmlformats.org/officeDocument/2006/math" xmlns="" val="1"/>
             </a:ext>
           </a:extLst>
         </p:spPr>
@@ -6024,7 +6024,7 @@
           </a:ln>
           <a:extLst>
             <a:ext uri="{C572A759-6A51-4108-AA02-DFA0A04FC94B}">
-              <ma14:wrappingTextBoxFlag xmlns="" xmlns:m="http://schemas.openxmlformats.org/officeDocument/2006/math" xmlns:a14="http://schemas.microsoft.com/office/drawing/2010/main" xmlns:ma14="http://schemas.microsoft.com/office/mac/drawingml/2011/main" val="1"/>
+              <ma14:wrappingTextBoxFlag xmlns:ma14="http://schemas.microsoft.com/office/mac/drawingml/2011/main" xmlns:a14="http://schemas.microsoft.com/office/drawing/2010/main" xmlns:m="http://schemas.openxmlformats.org/officeDocument/2006/math" xmlns="" val="1"/>
             </a:ext>
           </a:extLst>
         </p:spPr>
@@ -6963,7 +6963,7 @@
           </a:prstGeom>
           <a:extLst>
             <a:ext uri="{C572A759-6A51-4108-AA02-DFA0A04FC94B}">
-              <ma14:wrappingTextBoxFlag xmlns="" xmlns:m="http://schemas.openxmlformats.org/officeDocument/2006/math" xmlns:a14="http://schemas.microsoft.com/office/drawing/2010/main" xmlns:ma14="http://schemas.microsoft.com/office/mac/drawingml/2011/main" val="1"/>
+              <ma14:wrappingTextBoxFlag xmlns:ma14="http://schemas.microsoft.com/office/mac/drawingml/2011/main" xmlns:a14="http://schemas.microsoft.com/office/drawing/2010/main" xmlns:m="http://schemas.openxmlformats.org/officeDocument/2006/math" xmlns="" val="1"/>
             </a:ext>
           </a:extLst>
         </p:spPr>
@@ -7139,7 +7139,7 @@
           </a:prstGeom>
           <a:extLst>
             <a:ext uri="{C572A759-6A51-4108-AA02-DFA0A04FC94B}">
-              <ma14:wrappingTextBoxFlag xmlns="" xmlns:m="http://schemas.openxmlformats.org/officeDocument/2006/math" xmlns:a14="http://schemas.microsoft.com/office/drawing/2010/main" xmlns:ma14="http://schemas.microsoft.com/office/mac/drawingml/2011/main" val="1"/>
+              <ma14:wrappingTextBoxFlag xmlns:ma14="http://schemas.microsoft.com/office/mac/drawingml/2011/main" xmlns:a14="http://schemas.microsoft.com/office/drawing/2010/main" xmlns:m="http://schemas.openxmlformats.org/officeDocument/2006/math" xmlns="" val="1"/>
             </a:ext>
           </a:extLst>
         </p:spPr>
@@ -8791,7 +8791,7 @@
           </a:prstGeom>
           <a:extLst>
             <a:ext uri="{C572A759-6A51-4108-AA02-DFA0A04FC94B}">
-              <ma14:wrappingTextBoxFlag xmlns="" xmlns:m="http://schemas.openxmlformats.org/officeDocument/2006/math" xmlns:a14="http://schemas.microsoft.com/office/drawing/2010/main" xmlns:ma14="http://schemas.microsoft.com/office/mac/drawingml/2011/main" val="1"/>
+              <ma14:wrappingTextBoxFlag xmlns:ma14="http://schemas.microsoft.com/office/mac/drawingml/2011/main" xmlns:a14="http://schemas.microsoft.com/office/drawing/2010/main" xmlns:m="http://schemas.openxmlformats.org/officeDocument/2006/math" xmlns="" val="1"/>
             </a:ext>
           </a:extLst>
         </p:spPr>
@@ -10313,7 +10313,7 @@
           </a:prstGeom>
           <a:extLst>
             <a:ext uri="{C572A759-6A51-4108-AA02-DFA0A04FC94B}">
-              <ma14:wrappingTextBoxFlag xmlns="" xmlns:m="http://schemas.openxmlformats.org/officeDocument/2006/math" xmlns:a14="http://schemas.microsoft.com/office/drawing/2010/main" xmlns:ma14="http://schemas.microsoft.com/office/mac/drawingml/2011/main" val="1"/>
+              <ma14:wrappingTextBoxFlag xmlns:ma14="http://schemas.microsoft.com/office/mac/drawingml/2011/main" xmlns:a14="http://schemas.microsoft.com/office/drawing/2010/main" xmlns:m="http://schemas.openxmlformats.org/officeDocument/2006/math" xmlns="" val="1"/>
             </a:ext>
           </a:extLst>
         </p:spPr>
@@ -10900,7 +10900,7 @@
           </a:prstGeom>
           <a:extLst>
             <a:ext uri="{C572A759-6A51-4108-AA02-DFA0A04FC94B}">
-              <ma14:wrappingTextBoxFlag xmlns="" xmlns:m="http://schemas.openxmlformats.org/officeDocument/2006/math" xmlns:a14="http://schemas.microsoft.com/office/drawing/2010/main" xmlns:ma14="http://schemas.microsoft.com/office/mac/drawingml/2011/main" val="1"/>
+              <ma14:wrappingTextBoxFlag xmlns:ma14="http://schemas.microsoft.com/office/mac/drawingml/2011/main" xmlns:a14="http://schemas.microsoft.com/office/drawing/2010/main" xmlns:m="http://schemas.openxmlformats.org/officeDocument/2006/math" xmlns="" val="1"/>
             </a:ext>
           </a:extLst>
         </p:spPr>
@@ -14216,7 +14216,7 @@
           </a:prstGeom>
           <a:extLst>
             <a:ext uri="{C572A759-6A51-4108-AA02-DFA0A04FC94B}">
-              <ma14:wrappingTextBoxFlag xmlns="" xmlns:m="http://schemas.openxmlformats.org/officeDocument/2006/math" xmlns:a14="http://schemas.microsoft.com/office/drawing/2010/main" xmlns:ma14="http://schemas.microsoft.com/office/mac/drawingml/2011/main" val="1"/>
+              <ma14:wrappingTextBoxFlag xmlns:ma14="http://schemas.microsoft.com/office/mac/drawingml/2011/main" xmlns:a14="http://schemas.microsoft.com/office/drawing/2010/main" xmlns:m="http://schemas.openxmlformats.org/officeDocument/2006/math" xmlns="" val="1"/>
             </a:ext>
           </a:extLst>
         </p:spPr>
@@ -14820,7 +14820,7 @@
           </a:prstGeom>
           <a:extLst>
             <a:ext uri="{C572A759-6A51-4108-AA02-DFA0A04FC94B}">
-              <ma14:wrappingTextBoxFlag xmlns="" xmlns:m="http://schemas.openxmlformats.org/officeDocument/2006/math" xmlns:a14="http://schemas.microsoft.com/office/drawing/2010/main" xmlns:ma14="http://schemas.microsoft.com/office/mac/drawingml/2011/main" val="1"/>
+              <ma14:wrappingTextBoxFlag xmlns:ma14="http://schemas.microsoft.com/office/mac/drawingml/2011/main" xmlns:a14="http://schemas.microsoft.com/office/drawing/2010/main" xmlns:m="http://schemas.openxmlformats.org/officeDocument/2006/math" xmlns="" val="1"/>
             </a:ext>
           </a:extLst>
         </p:spPr>
@@ -15996,7 +15996,7 @@
           </a:prstGeom>
           <a:extLst>
             <a:ext uri="{C572A759-6A51-4108-AA02-DFA0A04FC94B}">
-              <ma14:wrappingTextBoxFlag xmlns="" xmlns:m="http://schemas.openxmlformats.org/officeDocument/2006/math" xmlns:a14="http://schemas.microsoft.com/office/drawing/2010/main" xmlns:ma14="http://schemas.microsoft.com/office/mac/drawingml/2011/main" val="1"/>
+              <ma14:wrappingTextBoxFlag xmlns:ma14="http://schemas.microsoft.com/office/mac/drawingml/2011/main" xmlns:a14="http://schemas.microsoft.com/office/drawing/2010/main" xmlns:m="http://schemas.openxmlformats.org/officeDocument/2006/math" xmlns="" val="1"/>
             </a:ext>
           </a:extLst>
         </p:spPr>
@@ -16191,7 +16191,7 @@
           </a:prstGeom>
           <a:extLst>
             <a:ext uri="{C572A759-6A51-4108-AA02-DFA0A04FC94B}">
-              <ma14:wrappingTextBoxFlag xmlns="" xmlns:m="http://schemas.openxmlformats.org/officeDocument/2006/math" xmlns:a14="http://schemas.microsoft.com/office/drawing/2010/main" xmlns:ma14="http://schemas.microsoft.com/office/mac/drawingml/2011/main" val="1"/>
+              <ma14:wrappingTextBoxFlag xmlns:ma14="http://schemas.microsoft.com/office/mac/drawingml/2011/main" xmlns:a14="http://schemas.microsoft.com/office/drawing/2010/main" xmlns:m="http://schemas.openxmlformats.org/officeDocument/2006/math" xmlns="" val="1"/>
             </a:ext>
           </a:extLst>
         </p:spPr>
@@ -17327,7 +17327,7 @@
           </a:prstGeom>
           <a:extLst>
             <a:ext uri="{C572A759-6A51-4108-AA02-DFA0A04FC94B}">
-              <ma14:wrappingTextBoxFlag xmlns="" xmlns:m="http://schemas.openxmlformats.org/officeDocument/2006/math" xmlns:a14="http://schemas.microsoft.com/office/drawing/2010/main" xmlns:ma14="http://schemas.microsoft.com/office/mac/drawingml/2011/main" val="1"/>
+              <ma14:wrappingTextBoxFlag xmlns:ma14="http://schemas.microsoft.com/office/mac/drawingml/2011/main" xmlns:a14="http://schemas.microsoft.com/office/drawing/2010/main" xmlns:m="http://schemas.openxmlformats.org/officeDocument/2006/math" xmlns="" val="1"/>
             </a:ext>
           </a:extLst>
         </p:spPr>
@@ -17728,7 +17728,7 @@
           </a:prstGeom>
           <a:extLst>
             <a:ext uri="{C572A759-6A51-4108-AA02-DFA0A04FC94B}">
-              <ma14:wrappingTextBoxFlag xmlns="" xmlns:m="http://schemas.openxmlformats.org/officeDocument/2006/math" xmlns:a14="http://schemas.microsoft.com/office/drawing/2010/main" xmlns:ma14="http://schemas.microsoft.com/office/mac/drawingml/2011/main" val="1"/>
+              <ma14:wrappingTextBoxFlag xmlns:ma14="http://schemas.microsoft.com/office/mac/drawingml/2011/main" xmlns:a14="http://schemas.microsoft.com/office/drawing/2010/main" xmlns:m="http://schemas.openxmlformats.org/officeDocument/2006/math" xmlns="" val="1"/>
             </a:ext>
           </a:extLst>
         </p:spPr>
@@ -18074,7 +18074,7 @@
           </a:prstGeom>
           <a:extLst>
             <a:ext uri="{C572A759-6A51-4108-AA02-DFA0A04FC94B}">
-              <ma14:wrappingTextBoxFlag xmlns="" xmlns:m="http://schemas.openxmlformats.org/officeDocument/2006/math" xmlns:a14="http://schemas.microsoft.com/office/drawing/2010/main" xmlns:ma14="http://schemas.microsoft.com/office/mac/drawingml/2011/main" val="1"/>
+              <ma14:wrappingTextBoxFlag xmlns:ma14="http://schemas.microsoft.com/office/mac/drawingml/2011/main" xmlns:a14="http://schemas.microsoft.com/office/drawing/2010/main" xmlns:m="http://schemas.openxmlformats.org/officeDocument/2006/math" xmlns="" val="1"/>
             </a:ext>
           </a:extLst>
         </p:spPr>
@@ -18195,7 +18195,7 @@
           </a:prstGeom>
           <a:extLst>
             <a:ext uri="{C572A759-6A51-4108-AA02-DFA0A04FC94B}">
-              <ma14:wrappingTextBoxFlag xmlns="" xmlns:m="http://schemas.openxmlformats.org/officeDocument/2006/math" xmlns:a14="http://schemas.microsoft.com/office/drawing/2010/main" xmlns:ma14="http://schemas.microsoft.com/office/mac/drawingml/2011/main" val="1"/>
+              <ma14:wrappingTextBoxFlag xmlns:ma14="http://schemas.microsoft.com/office/mac/drawingml/2011/main" xmlns:a14="http://schemas.microsoft.com/office/drawing/2010/main" xmlns:m="http://schemas.openxmlformats.org/officeDocument/2006/math" xmlns="" val="1"/>
             </a:ext>
           </a:extLst>
         </p:spPr>
@@ -18642,7 +18642,7 @@
           </a:ln>
           <a:extLst>
             <a:ext uri="{C572A759-6A51-4108-AA02-DFA0A04FC94B}">
-              <ma14:wrappingTextBoxFlag xmlns:ma14="http://schemas.microsoft.com/office/mac/drawingml/2011/main" xmlns="" val="1"/>
+              <ma14:wrappingTextBoxFlag xmlns="" xmlns:ma14="http://schemas.microsoft.com/office/mac/drawingml/2011/main" val="1"/>
             </a:ext>
           </a:extLst>
         </p:spPr>
@@ -18696,7 +18696,7 @@
           </a:ln>
           <a:extLst>
             <a:ext uri="{C572A759-6A51-4108-AA02-DFA0A04FC94B}">
-              <ma14:wrappingTextBoxFlag xmlns:ma14="http://schemas.microsoft.com/office/mac/drawingml/2011/main" xmlns="" val="1"/>
+              <ma14:wrappingTextBoxFlag xmlns="" xmlns:ma14="http://schemas.microsoft.com/office/mac/drawingml/2011/main" val="1"/>
             </a:ext>
           </a:extLst>
         </p:spPr>
@@ -18750,7 +18750,7 @@
           </a:ln>
           <a:extLst>
             <a:ext uri="{C572A759-6A51-4108-AA02-DFA0A04FC94B}">
-              <ma14:wrappingTextBoxFlag xmlns:ma14="http://schemas.microsoft.com/office/mac/drawingml/2011/main" xmlns="" val="1"/>
+              <ma14:wrappingTextBoxFlag xmlns="" xmlns:ma14="http://schemas.microsoft.com/office/mac/drawingml/2011/main" val="1"/>
             </a:ext>
           </a:extLst>
         </p:spPr>
@@ -18807,7 +18807,7 @@
           </a:ln>
           <a:extLst>
             <a:ext uri="{C572A759-6A51-4108-AA02-DFA0A04FC94B}">
-              <ma14:wrappingTextBoxFlag xmlns:ma14="http://schemas.microsoft.com/office/mac/drawingml/2011/main" xmlns="" val="1"/>
+              <ma14:wrappingTextBoxFlag xmlns="" xmlns:ma14="http://schemas.microsoft.com/office/mac/drawingml/2011/main" val="1"/>
             </a:ext>
           </a:extLst>
         </p:spPr>
@@ -18908,7 +18908,7 @@
           </a:ln>
           <a:extLst>
             <a:ext uri="{C572A759-6A51-4108-AA02-DFA0A04FC94B}">
-              <ma14:wrappingTextBoxFlag xmlns:ma14="http://schemas.microsoft.com/office/mac/drawingml/2011/main" xmlns="" val="1"/>
+              <ma14:wrappingTextBoxFlag xmlns="" xmlns:ma14="http://schemas.microsoft.com/office/mac/drawingml/2011/main" val="1"/>
             </a:ext>
           </a:extLst>
         </p:spPr>
@@ -19112,7 +19112,7 @@
           </a:prstGeom>
           <a:extLst>
             <a:ext uri="{C572A759-6A51-4108-AA02-DFA0A04FC94B}">
-              <ma14:wrappingTextBoxFlag xmlns="" xmlns:m="http://schemas.openxmlformats.org/officeDocument/2006/math" xmlns:a14="http://schemas.microsoft.com/office/drawing/2010/main" xmlns:ma14="http://schemas.microsoft.com/office/mac/drawingml/2011/main" val="1"/>
+              <ma14:wrappingTextBoxFlag xmlns:ma14="http://schemas.microsoft.com/office/mac/drawingml/2011/main" xmlns:a14="http://schemas.microsoft.com/office/drawing/2010/main" xmlns:m="http://schemas.openxmlformats.org/officeDocument/2006/math" xmlns="" val="1"/>
             </a:ext>
           </a:extLst>
         </p:spPr>
@@ -19603,7 +19603,7 @@
           </a:ln>
           <a:extLst>
             <a:ext uri="{C572A759-6A51-4108-AA02-DFA0A04FC94B}">
-              <ma14:wrappingTextBoxFlag xmlns:ma14="http://schemas.microsoft.com/office/mac/drawingml/2011/main" xmlns="" val="1"/>
+              <ma14:wrappingTextBoxFlag xmlns="" xmlns:ma14="http://schemas.microsoft.com/office/mac/drawingml/2011/main" val="1"/>
             </a:ext>
           </a:extLst>
         </p:spPr>
@@ -19657,7 +19657,7 @@
           </a:ln>
           <a:extLst>
             <a:ext uri="{C572A759-6A51-4108-AA02-DFA0A04FC94B}">
-              <ma14:wrappingTextBoxFlag xmlns:ma14="http://schemas.microsoft.com/office/mac/drawingml/2011/main" xmlns="" val="1"/>
+              <ma14:wrappingTextBoxFlag xmlns="" xmlns:ma14="http://schemas.microsoft.com/office/mac/drawingml/2011/main" val="1"/>
             </a:ext>
           </a:extLst>
         </p:spPr>
@@ -19711,7 +19711,7 @@
           </a:ln>
           <a:extLst>
             <a:ext uri="{C572A759-6A51-4108-AA02-DFA0A04FC94B}">
-              <ma14:wrappingTextBoxFlag xmlns:ma14="http://schemas.microsoft.com/office/mac/drawingml/2011/main" xmlns="" val="1"/>
+              <ma14:wrappingTextBoxFlag xmlns="" xmlns:ma14="http://schemas.microsoft.com/office/mac/drawingml/2011/main" val="1"/>
             </a:ext>
           </a:extLst>
         </p:spPr>
@@ -19768,7 +19768,7 @@
           </a:ln>
           <a:extLst>
             <a:ext uri="{C572A759-6A51-4108-AA02-DFA0A04FC94B}">
-              <ma14:wrappingTextBoxFlag xmlns:ma14="http://schemas.microsoft.com/office/mac/drawingml/2011/main" xmlns="" val="1"/>
+              <ma14:wrappingTextBoxFlag xmlns="" xmlns:ma14="http://schemas.microsoft.com/office/mac/drawingml/2011/main" val="1"/>
             </a:ext>
           </a:extLst>
         </p:spPr>
@@ -19869,7 +19869,7 @@
           </a:ln>
           <a:extLst>
             <a:ext uri="{C572A759-6A51-4108-AA02-DFA0A04FC94B}">
-              <ma14:wrappingTextBoxFlag xmlns:ma14="http://schemas.microsoft.com/office/mac/drawingml/2011/main" xmlns="" val="1"/>
+              <ma14:wrappingTextBoxFlag xmlns="" xmlns:ma14="http://schemas.microsoft.com/office/mac/drawingml/2011/main" val="1"/>
             </a:ext>
           </a:extLst>
         </p:spPr>
@@ -20060,7 +20060,7 @@
           </a:prstGeom>
           <a:extLst>
             <a:ext uri="{C572A759-6A51-4108-AA02-DFA0A04FC94B}">
-              <ma14:wrappingTextBoxFlag xmlns="" xmlns:m="http://schemas.openxmlformats.org/officeDocument/2006/math" xmlns:a14="http://schemas.microsoft.com/office/drawing/2010/main" xmlns:ma14="http://schemas.microsoft.com/office/mac/drawingml/2011/main" val="1"/>
+              <ma14:wrappingTextBoxFlag xmlns:ma14="http://schemas.microsoft.com/office/mac/drawingml/2011/main" xmlns:a14="http://schemas.microsoft.com/office/drawing/2010/main" xmlns:m="http://schemas.openxmlformats.org/officeDocument/2006/math" xmlns="" val="1"/>
             </a:ext>
           </a:extLst>
         </p:spPr>
@@ -20509,7 +20509,7 @@
           </a:ln>
           <a:extLst>
             <a:ext uri="{C572A759-6A51-4108-AA02-DFA0A04FC94B}">
-              <ma14:wrappingTextBoxFlag xmlns:ma14="http://schemas.microsoft.com/office/mac/drawingml/2011/main" xmlns="" val="1"/>
+              <ma14:wrappingTextBoxFlag xmlns="" xmlns:ma14="http://schemas.microsoft.com/office/mac/drawingml/2011/main" val="1"/>
             </a:ext>
           </a:extLst>
         </p:spPr>
@@ -20563,7 +20563,7 @@
           </a:ln>
           <a:extLst>
             <a:ext uri="{C572A759-6A51-4108-AA02-DFA0A04FC94B}">
-              <ma14:wrappingTextBoxFlag xmlns:ma14="http://schemas.microsoft.com/office/mac/drawingml/2011/main" xmlns="" val="1"/>
+              <ma14:wrappingTextBoxFlag xmlns="" xmlns:ma14="http://schemas.microsoft.com/office/mac/drawingml/2011/main" val="1"/>
             </a:ext>
           </a:extLst>
         </p:spPr>
@@ -20617,7 +20617,7 @@
           </a:ln>
           <a:extLst>
             <a:ext uri="{C572A759-6A51-4108-AA02-DFA0A04FC94B}">
-              <ma14:wrappingTextBoxFlag xmlns:ma14="http://schemas.microsoft.com/office/mac/drawingml/2011/main" xmlns="" val="1"/>
+              <ma14:wrappingTextBoxFlag xmlns="" xmlns:ma14="http://schemas.microsoft.com/office/mac/drawingml/2011/main" val="1"/>
             </a:ext>
           </a:extLst>
         </p:spPr>
@@ -20674,7 +20674,7 @@
           </a:ln>
           <a:extLst>
             <a:ext uri="{C572A759-6A51-4108-AA02-DFA0A04FC94B}">
-              <ma14:wrappingTextBoxFlag xmlns:ma14="http://schemas.microsoft.com/office/mac/drawingml/2011/main" xmlns="" val="1"/>
+              <ma14:wrappingTextBoxFlag xmlns="" xmlns:ma14="http://schemas.microsoft.com/office/mac/drawingml/2011/main" val="1"/>
             </a:ext>
           </a:extLst>
         </p:spPr>
@@ -20775,7 +20775,7 @@
           </a:ln>
           <a:extLst>
             <a:ext uri="{C572A759-6A51-4108-AA02-DFA0A04FC94B}">
-              <ma14:wrappingTextBoxFlag xmlns:ma14="http://schemas.microsoft.com/office/mac/drawingml/2011/main" xmlns="" val="1"/>
+              <ma14:wrappingTextBoxFlag xmlns="" xmlns:ma14="http://schemas.microsoft.com/office/mac/drawingml/2011/main" val="1"/>
             </a:ext>
           </a:extLst>
         </p:spPr>
@@ -21046,7 +21046,7 @@
           </a:prstGeom>
           <a:extLst>
             <a:ext uri="{C572A759-6A51-4108-AA02-DFA0A04FC94B}">
-              <ma14:wrappingTextBoxFlag xmlns="" xmlns:m="http://schemas.openxmlformats.org/officeDocument/2006/math" xmlns:a14="http://schemas.microsoft.com/office/drawing/2010/main" xmlns:ma14="http://schemas.microsoft.com/office/mac/drawingml/2011/main" val="1"/>
+              <ma14:wrappingTextBoxFlag xmlns:ma14="http://schemas.microsoft.com/office/mac/drawingml/2011/main" xmlns:a14="http://schemas.microsoft.com/office/drawing/2010/main" xmlns:m="http://schemas.openxmlformats.org/officeDocument/2006/math" xmlns="" val="1"/>
             </a:ext>
           </a:extLst>
         </p:spPr>
@@ -21584,7 +21584,7 @@
           </a:ln>
           <a:extLst>
             <a:ext uri="{C572A759-6A51-4108-AA02-DFA0A04FC94B}">
-              <ma14:wrappingTextBoxFlag xmlns:ma14="http://schemas.microsoft.com/office/mac/drawingml/2011/main" xmlns="" val="1"/>
+              <ma14:wrappingTextBoxFlag xmlns="" xmlns:ma14="http://schemas.microsoft.com/office/mac/drawingml/2011/main" val="1"/>
             </a:ext>
           </a:extLst>
         </p:spPr>
@@ -21638,7 +21638,7 @@
           </a:ln>
           <a:extLst>
             <a:ext uri="{C572A759-6A51-4108-AA02-DFA0A04FC94B}">
-              <ma14:wrappingTextBoxFlag xmlns:ma14="http://schemas.microsoft.com/office/mac/drawingml/2011/main" xmlns="" val="1"/>
+              <ma14:wrappingTextBoxFlag xmlns="" xmlns:ma14="http://schemas.microsoft.com/office/mac/drawingml/2011/main" val="1"/>
             </a:ext>
           </a:extLst>
         </p:spPr>
@@ -21692,7 +21692,7 @@
           </a:ln>
           <a:extLst>
             <a:ext uri="{C572A759-6A51-4108-AA02-DFA0A04FC94B}">
-              <ma14:wrappingTextBoxFlag xmlns:ma14="http://schemas.microsoft.com/office/mac/drawingml/2011/main" xmlns="" val="1"/>
+              <ma14:wrappingTextBoxFlag xmlns="" xmlns:ma14="http://schemas.microsoft.com/office/mac/drawingml/2011/main" val="1"/>
             </a:ext>
           </a:extLst>
         </p:spPr>
@@ -21749,7 +21749,7 @@
           </a:ln>
           <a:extLst>
             <a:ext uri="{C572A759-6A51-4108-AA02-DFA0A04FC94B}">
-              <ma14:wrappingTextBoxFlag xmlns:ma14="http://schemas.microsoft.com/office/mac/drawingml/2011/main" xmlns="" val="1"/>
+              <ma14:wrappingTextBoxFlag xmlns="" xmlns:ma14="http://schemas.microsoft.com/office/mac/drawingml/2011/main" val="1"/>
             </a:ext>
           </a:extLst>
         </p:spPr>
@@ -21850,7 +21850,7 @@
           </a:ln>
           <a:extLst>
             <a:ext uri="{C572A759-6A51-4108-AA02-DFA0A04FC94B}">
-              <ma14:wrappingTextBoxFlag xmlns:ma14="http://schemas.microsoft.com/office/mac/drawingml/2011/main" xmlns="" val="1"/>
+              <ma14:wrappingTextBoxFlag xmlns="" xmlns:ma14="http://schemas.microsoft.com/office/mac/drawingml/2011/main" val="1"/>
             </a:ext>
           </a:extLst>
         </p:spPr>
@@ -22396,7 +22396,7 @@
           </a:prstGeom>
           <a:extLst>
             <a:ext uri="{C572A759-6A51-4108-AA02-DFA0A04FC94B}">
-              <ma14:wrappingTextBoxFlag xmlns="" xmlns:m="http://schemas.openxmlformats.org/officeDocument/2006/math" xmlns:a14="http://schemas.microsoft.com/office/drawing/2010/main" xmlns:ma14="http://schemas.microsoft.com/office/mac/drawingml/2011/main" val="1"/>
+              <ma14:wrappingTextBoxFlag xmlns:ma14="http://schemas.microsoft.com/office/mac/drawingml/2011/main" xmlns:a14="http://schemas.microsoft.com/office/drawing/2010/main" xmlns:m="http://schemas.openxmlformats.org/officeDocument/2006/math" xmlns="" val="1"/>
             </a:ext>
           </a:extLst>
         </p:spPr>
@@ -22809,7 +22809,7 @@
             <a:effectLst/>
             <a:extLst>
               <a:ext uri="{C572A759-6A51-4108-AA02-DFA0A04FC94B}">
-                <ma14:wrappingTextBoxFlag xmlns:ma14="http://schemas.microsoft.com/office/mac/drawingml/2011/main" xmlns="" val="1"/>
+                <ma14:wrappingTextBoxFlag xmlns="" xmlns:ma14="http://schemas.microsoft.com/office/mac/drawingml/2011/main" val="1"/>
               </a:ext>
             </a:extLst>
           </p:spPr>
@@ -22863,7 +22863,7 @@
             <a:effectLst/>
             <a:extLst>
               <a:ext uri="{C572A759-6A51-4108-AA02-DFA0A04FC94B}">
-                <ma14:wrappingTextBoxFlag xmlns:ma14="http://schemas.microsoft.com/office/mac/drawingml/2011/main" xmlns="" val="1"/>
+                <ma14:wrappingTextBoxFlag xmlns="" xmlns:ma14="http://schemas.microsoft.com/office/mac/drawingml/2011/main" val="1"/>
               </a:ext>
             </a:extLst>
           </p:spPr>
@@ -22925,7 +22925,7 @@
             <a:effectLst/>
             <a:extLst>
               <a:ext uri="{C572A759-6A51-4108-AA02-DFA0A04FC94B}">
-                <ma14:wrappingTextBoxFlag xmlns:ma14="http://schemas.microsoft.com/office/mac/drawingml/2011/main" xmlns="" val="1"/>
+                <ma14:wrappingTextBoxFlag xmlns="" xmlns:ma14="http://schemas.microsoft.com/office/mac/drawingml/2011/main" val="1"/>
               </a:ext>
             </a:extLst>
           </p:spPr>
@@ -23036,7 +23036,7 @@
             <a:effectLst/>
             <a:extLst>
               <a:ext uri="{C572A759-6A51-4108-AA02-DFA0A04FC94B}">
-                <ma14:wrappingTextBoxFlag xmlns:ma14="http://schemas.microsoft.com/office/mac/drawingml/2011/main" xmlns="" val="1"/>
+                <ma14:wrappingTextBoxFlag xmlns="" xmlns:ma14="http://schemas.microsoft.com/office/mac/drawingml/2011/main" val="1"/>
               </a:ext>
             </a:extLst>
           </p:spPr>
@@ -23196,7 +23196,7 @@
             <a:effectLst/>
             <a:extLst>
               <a:ext uri="{C572A759-6A51-4108-AA02-DFA0A04FC94B}">
-                <ma14:wrappingTextBoxFlag xmlns:ma14="http://schemas.microsoft.com/office/mac/drawingml/2011/main" xmlns="" val="1"/>
+                <ma14:wrappingTextBoxFlag xmlns="" xmlns:ma14="http://schemas.microsoft.com/office/mac/drawingml/2011/main" val="1"/>
               </a:ext>
             </a:extLst>
           </p:spPr>
@@ -23432,7 +23432,7 @@
           </a:prstGeom>
           <a:extLst>
             <a:ext uri="{C572A759-6A51-4108-AA02-DFA0A04FC94B}">
-              <ma14:wrappingTextBoxFlag xmlns="" xmlns:m="http://schemas.openxmlformats.org/officeDocument/2006/math" xmlns:a14="http://schemas.microsoft.com/office/drawing/2010/main" xmlns:ma14="http://schemas.microsoft.com/office/mac/drawingml/2011/main" val="1"/>
+              <ma14:wrappingTextBoxFlag xmlns:ma14="http://schemas.microsoft.com/office/mac/drawingml/2011/main" xmlns:a14="http://schemas.microsoft.com/office/drawing/2010/main" xmlns:m="http://schemas.openxmlformats.org/officeDocument/2006/math" xmlns="" val="1"/>
             </a:ext>
           </a:extLst>
         </p:spPr>
@@ -24757,7 +24757,15 @@
           <a:p>
             <a:r>
               <a:rPr lang="da-DK" dirty="0"/>
-              <a:t>Tip on guide end arm</a:t>
+              <a:t>Tip: </a:t>
+            </a:r>
+            <a:r>
+              <a:rPr lang="da-DK" dirty="0" err="1"/>
+              <a:t>Insert</a:t>
+            </a:r>
+            <a:r>
+              <a:rPr lang="da-DK" dirty="0"/>
+              <a:t> a guide at the end of the guide</a:t>
             </a:r>
           </a:p>
         </p:txBody>
@@ -24782,7 +24790,7 @@
           </a:prstGeom>
           <a:extLst>
             <a:ext uri="{C572A759-6A51-4108-AA02-DFA0A04FC94B}">
-              <ma14:wrappingTextBoxFlag xmlns="" xmlns:m="http://schemas.openxmlformats.org/officeDocument/2006/math" xmlns:a14="http://schemas.microsoft.com/office/drawing/2010/main" xmlns:ma14="http://schemas.microsoft.com/office/mac/drawingml/2011/main" val="1"/>
+              <ma14:wrappingTextBoxFlag xmlns:ma14="http://schemas.microsoft.com/office/mac/drawingml/2011/main" xmlns:a14="http://schemas.microsoft.com/office/drawing/2010/main" xmlns:m="http://schemas.openxmlformats.org/officeDocument/2006/math" xmlns="" val="1"/>
             </a:ext>
           </a:extLst>
         </p:spPr>

</xml_diff>